<commit_message>
Feature/m0078 ddg 277 ui3 draft (#1)
UI3 updates
</commit_message>
<xml_diff>
--- a/PlatformDeveloperGuide/images/copy-step1.pptx
+++ b/PlatformDeveloperGuide/images/copy-step1.pptx
@@ -104,6 +104,11 @@
       </a:defRPr>
     </a:lvl9pPr>
   </p:defaultTextStyle>
+  <p:extLst>
+    <p:ext uri="{EFAFB233-063F-42B5-8137-9DF3F51BA10A}">
+      <p15:sldGuideLst xmlns:p15="http://schemas.microsoft.com/office/powerpoint/2012/main"/>
+    </p:ext>
+  </p:extLst>
 </p:presentation>
 </file>
 
@@ -256,7 +261,7 @@
           <a:p>
             <a:fld id="{75F1A76E-148A-45A3-B166-DB7E79C83993}" type="datetimeFigureOut">
               <a:rPr lang="en-GB" smtClean="0"/>
-              <a:t>19/03/2020</a:t>
+              <a:t>03/08/2020</a:t>
             </a:fld>
             <a:endParaRPr lang="en-GB"/>
           </a:p>
@@ -456,7 +461,7 @@
           <a:p>
             <a:fld id="{75F1A76E-148A-45A3-B166-DB7E79C83993}" type="datetimeFigureOut">
               <a:rPr lang="en-GB" smtClean="0"/>
-              <a:t>19/03/2020</a:t>
+              <a:t>03/08/2020</a:t>
             </a:fld>
             <a:endParaRPr lang="en-GB"/>
           </a:p>
@@ -666,7 +671,7 @@
           <a:p>
             <a:fld id="{75F1A76E-148A-45A3-B166-DB7E79C83993}" type="datetimeFigureOut">
               <a:rPr lang="en-GB" smtClean="0"/>
-              <a:t>19/03/2020</a:t>
+              <a:t>03/08/2020</a:t>
             </a:fld>
             <a:endParaRPr lang="en-GB"/>
           </a:p>
@@ -866,7 +871,7 @@
           <a:p>
             <a:fld id="{75F1A76E-148A-45A3-B166-DB7E79C83993}" type="datetimeFigureOut">
               <a:rPr lang="en-GB" smtClean="0"/>
-              <a:t>19/03/2020</a:t>
+              <a:t>03/08/2020</a:t>
             </a:fld>
             <a:endParaRPr lang="en-GB"/>
           </a:p>
@@ -1142,7 +1147,7 @@
           <a:p>
             <a:fld id="{75F1A76E-148A-45A3-B166-DB7E79C83993}" type="datetimeFigureOut">
               <a:rPr lang="en-GB" smtClean="0"/>
-              <a:t>19/03/2020</a:t>
+              <a:t>03/08/2020</a:t>
             </a:fld>
             <a:endParaRPr lang="en-GB"/>
           </a:p>
@@ -1410,7 +1415,7 @@
           <a:p>
             <a:fld id="{75F1A76E-148A-45A3-B166-DB7E79C83993}" type="datetimeFigureOut">
               <a:rPr lang="en-GB" smtClean="0"/>
-              <a:t>19/03/2020</a:t>
+              <a:t>03/08/2020</a:t>
             </a:fld>
             <a:endParaRPr lang="en-GB"/>
           </a:p>
@@ -1825,7 +1830,7 @@
           <a:p>
             <a:fld id="{75F1A76E-148A-45A3-B166-DB7E79C83993}" type="datetimeFigureOut">
               <a:rPr lang="en-GB" smtClean="0"/>
-              <a:t>19/03/2020</a:t>
+              <a:t>03/08/2020</a:t>
             </a:fld>
             <a:endParaRPr lang="en-GB"/>
           </a:p>
@@ -1967,7 +1972,7 @@
           <a:p>
             <a:fld id="{75F1A76E-148A-45A3-B166-DB7E79C83993}" type="datetimeFigureOut">
               <a:rPr lang="en-GB" smtClean="0"/>
-              <a:t>19/03/2020</a:t>
+              <a:t>03/08/2020</a:t>
             </a:fld>
             <a:endParaRPr lang="en-GB"/>
           </a:p>
@@ -2080,7 +2085,7 @@
           <a:p>
             <a:fld id="{75F1A76E-148A-45A3-B166-DB7E79C83993}" type="datetimeFigureOut">
               <a:rPr lang="en-GB" smtClean="0"/>
-              <a:t>19/03/2020</a:t>
+              <a:t>03/08/2020</a:t>
             </a:fld>
             <a:endParaRPr lang="en-GB"/>
           </a:p>
@@ -2393,7 +2398,7 @@
           <a:p>
             <a:fld id="{75F1A76E-148A-45A3-B166-DB7E79C83993}" type="datetimeFigureOut">
               <a:rPr lang="en-GB" smtClean="0"/>
-              <a:t>19/03/2020</a:t>
+              <a:t>03/08/2020</a:t>
             </a:fld>
             <a:endParaRPr lang="en-GB"/>
           </a:p>
@@ -2682,7 +2687,7 @@
           <a:p>
             <a:fld id="{75F1A76E-148A-45A3-B166-DB7E79C83993}" type="datetimeFigureOut">
               <a:rPr lang="en-GB" smtClean="0"/>
-              <a:t>19/03/2020</a:t>
+              <a:t>03/08/2020</a:t>
             </a:fld>
             <a:endParaRPr lang="en-GB"/>
           </a:p>
@@ -2925,7 +2930,7 @@
           <a:p>
             <a:fld id="{75F1A76E-148A-45A3-B166-DB7E79C83993}" type="datetimeFigureOut">
               <a:rPr lang="en-GB" smtClean="0"/>
-              <a:t>19/03/2020</a:t>
+              <a:t>03/08/2020</a:t>
             </a:fld>
             <a:endParaRPr lang="en-GB"/>
           </a:p>
@@ -3476,6 +3481,23 @@
               <a:defRPr/>
             </a:pPr>
             <a:r>
+              <a:rPr kumimoji="0" lang="en-US" sz="1200" b="1" u="none" strike="noStrike" kern="0" cap="none" spc="0" normalizeH="0" baseline="0" noProof="0">
+                <a:ln>
+                  <a:noFill/>
+                </a:ln>
+                <a:solidFill>
+                  <a:srgbClr val="FFFFFF"/>
+                </a:solidFill>
+                <a:effectLst/>
+                <a:uLnTx/>
+                <a:uFillTx/>
+                <a:latin typeface="Source Sans Pro Light" charset="0"/>
+                <a:ea typeface="Source Sans Pro Light" charset="0"/>
+                <a:cs typeface="Source Sans Pro Light" charset="0"/>
+              </a:rPr>
+              <a:t>Display </a:t>
+            </a:r>
+            <a:r>
               <a:rPr kumimoji="0" lang="en-US" sz="1200" b="1" u="none" strike="noStrike" kern="0" cap="none" spc="0" normalizeH="0" baseline="0" noProof="0" dirty="0">
                 <a:ln>
                   <a:noFill/>
@@ -3490,7 +3512,7 @@
                 <a:ea typeface="Source Sans Pro Light" charset="0"/>
                 <a:cs typeface="Source Sans Pro Light" charset="0"/>
               </a:rPr>
-              <a:t>Back Buffer</a:t>
+              <a:t>Buffer</a:t>
             </a:r>
           </a:p>
         </p:txBody>
@@ -3567,7 +3589,7 @@
                 <a:ea typeface="Source Sans Pro Light" charset="0"/>
                 <a:cs typeface="Source Sans Pro Light" charset="0"/>
               </a:rPr>
-              <a:t>Display Buffer</a:t>
+              <a:t>Back Buffer</a:t>
             </a:r>
           </a:p>
         </p:txBody>

</xml_diff>